<commit_message>
release V2021-1-2, happy new year
</commit_message>
<xml_diff>
--- a/_book/plot/sinepharm-survey-hospital-lvl2-piechart-1.pptx
+++ b/_book/plot/sinepharm-survey-hospital-lvl2-piechart-1.pptx
@@ -6704,7 +6704,7 @@
               <a:avLst/>
             </a:prstGeom>
             <a:solidFill>
-              <a:srgbClr val="F8766D">
+              <a:srgbClr val="619CFF">
                 <a:alpha val="100000"/>
               </a:srgbClr>
             </a:solidFill>
@@ -6774,7 +6774,7 @@
               <a:avLst/>
             </a:prstGeom>
             <a:solidFill>
-              <a:srgbClr val="619CFF">
+              <a:srgbClr val="F8766D">
                 <a:alpha val="100000"/>
               </a:srgbClr>
             </a:solidFill>
@@ -6835,7 +6835,7 @@
                   <a:latin typeface="Arial"/>
                   <a:cs typeface="Arial"/>
                 </a:rPr>
-                <a:t>三</a:t>
+                <a:t>一</a:t>
               </a:r>
             </a:p>
           </p:txBody>
@@ -6927,7 +6927,7 @@
                   <a:latin typeface="Arial"/>
                   <a:cs typeface="Arial"/>
                 </a:rPr>
-                <a:t>一</a:t>
+                <a:t>三</a:t>
               </a:r>
             </a:p>
           </p:txBody>

</xml_diff>